<commit_message>
added proof for SM = GG and added further example to presentation
</commit_message>
<xml_diff>
--- a/presentation/presentation.pptx
+++ b/presentation/presentation.pptx
@@ -5,7 +5,7 @@
     <p:sldMasterId id="2147483888" r:id="rId1"/>
   </p:sldMasterIdLst>
   <p:notesMasterIdLst>
-    <p:notesMasterId r:id="rId13"/>
+    <p:notesMasterId r:id="rId14"/>
   </p:notesMasterIdLst>
   <p:sldIdLst>
     <p:sldId id="256" r:id="rId2"/>
@@ -15,10 +15,11 @@
     <p:sldId id="264" r:id="rId6"/>
     <p:sldId id="266" r:id="rId7"/>
     <p:sldId id="265" r:id="rId8"/>
-    <p:sldId id="260" r:id="rId9"/>
-    <p:sldId id="259" r:id="rId10"/>
-    <p:sldId id="261" r:id="rId11"/>
-    <p:sldId id="262" r:id="rId12"/>
+    <p:sldId id="267" r:id="rId9"/>
+    <p:sldId id="260" r:id="rId10"/>
+    <p:sldId id="259" r:id="rId11"/>
+    <p:sldId id="261" r:id="rId12"/>
+    <p:sldId id="262" r:id="rId13"/>
   </p:sldIdLst>
   <p:sldSz cx="9144000" cy="6858000" type="screen4x3"/>
   <p:notesSz cx="6858000" cy="9144000"/>
@@ -202,7 +203,8 @@
           <a:p>
             <a:fld id="{AE3CADF8-A956-42B8-83A8-EB8A923FF774}" type="datetimeFigureOut">
               <a:rPr lang="en-US" smtClean="0"/>
-              <a:t>5/31/2012</a:t>
+              <a:pPr/>
+              <a:t>6/1/2012</a:t>
             </a:fld>
             <a:endParaRPr lang="en-US"/>
           </a:p>
@@ -363,6 +365,7 @@
           <a:p>
             <a:fld id="{60E45991-1322-4FB0-86FC-7102C4823355}" type="slidenum">
               <a:rPr lang="en-US" smtClean="0"/>
+              <a:pPr/>
               <a:t>‹#›</a:t>
             </a:fld>
             <a:endParaRPr lang="en-US"/>
@@ -586,7 +589,94 @@
           <a:p>
             <a:fld id="{60E45991-1322-4FB0-86FC-7102C4823355}" type="slidenum">
               <a:rPr lang="en-US" smtClean="0"/>
+              <a:pPr/>
               <a:t>2</a:t>
+            </a:fld>
+            <a:endParaRPr lang="en-US"/>
+          </a:p>
+        </p:txBody>
+      </p:sp>
+    </p:spTree>
+  </p:cSld>
+  <p:clrMapOvr>
+    <a:masterClrMapping/>
+  </p:clrMapOvr>
+</p:notes>
+</file>
+
+<file path=ppt/notesSlides/notesSlide10.xml><?xml version="1.0" encoding="utf-8"?>
+<p:notes xmlns:a="http://schemas.openxmlformats.org/drawingml/2006/main" xmlns:r="http://schemas.openxmlformats.org/officeDocument/2006/relationships" xmlns:p="http://schemas.openxmlformats.org/presentationml/2006/main">
+  <p:cSld>
+    <p:spTree>
+      <p:nvGrpSpPr>
+        <p:cNvPr id="1" name=""/>
+        <p:cNvGrpSpPr/>
+        <p:nvPr/>
+      </p:nvGrpSpPr>
+      <p:grpSpPr>
+        <a:xfrm>
+          <a:off x="0" y="0"/>
+          <a:ext cx="0" cy="0"/>
+          <a:chOff x="0" y="0"/>
+          <a:chExt cx="0" cy="0"/>
+        </a:xfrm>
+      </p:grpSpPr>
+      <p:sp>
+        <p:nvSpPr>
+          <p:cNvPr id="2" name="Slide Image Placeholder 1"/>
+          <p:cNvSpPr>
+            <a:spLocks noGrp="1" noRot="1" noChangeAspect="1"/>
+          </p:cNvSpPr>
+          <p:nvPr>
+            <p:ph type="sldImg"/>
+          </p:nvPr>
+        </p:nvSpPr>
+        <p:spPr/>
+      </p:sp>
+      <p:sp>
+        <p:nvSpPr>
+          <p:cNvPr id="3" name="Notes Placeholder 2"/>
+          <p:cNvSpPr>
+            <a:spLocks noGrp="1"/>
+          </p:cNvSpPr>
+          <p:nvPr>
+            <p:ph type="body" idx="1"/>
+          </p:nvPr>
+        </p:nvSpPr>
+        <p:spPr/>
+        <p:txBody>
+          <a:bodyPr>
+            <a:normAutofit/>
+          </a:bodyPr>
+          <a:lstStyle/>
+          <a:p>
+            <a:r>
+              <a:rPr lang="en-US" dirty="0" smtClean="0"/>
+              <a:t>What else?</a:t>
+            </a:r>
+            <a:endParaRPr lang="en-US" dirty="0"/>
+          </a:p>
+        </p:txBody>
+      </p:sp>
+      <p:sp>
+        <p:nvSpPr>
+          <p:cNvPr id="4" name="Slide Number Placeholder 3"/>
+          <p:cNvSpPr>
+            <a:spLocks noGrp="1"/>
+          </p:cNvSpPr>
+          <p:nvPr>
+            <p:ph type="sldNum" sz="quarter" idx="10"/>
+          </p:nvPr>
+        </p:nvSpPr>
+        <p:spPr/>
+        <p:txBody>
+          <a:bodyPr/>
+          <a:lstStyle/>
+          <a:p>
+            <a:fld id="{60E45991-1322-4FB0-86FC-7102C4823355}" type="slidenum">
+              <a:rPr lang="en-US" smtClean="0"/>
+              <a:pPr/>
+              <a:t>11</a:t>
             </a:fld>
             <a:endParaRPr lang="en-US"/>
           </a:p>
@@ -675,6 +765,7 @@
           <a:p>
             <a:fld id="{60E45991-1322-4FB0-86FC-7102C4823355}" type="slidenum">
               <a:rPr lang="en-US" smtClean="0"/>
+              <a:pPr/>
               <a:t>3</a:t>
             </a:fld>
             <a:endParaRPr lang="en-US"/>
@@ -764,6 +855,7 @@
           <a:p>
             <a:fld id="{60E45991-1322-4FB0-86FC-7102C4823355}" type="slidenum">
               <a:rPr lang="en-US" smtClean="0"/>
+              <a:pPr/>
               <a:t>4</a:t>
             </a:fld>
             <a:endParaRPr lang="en-US"/>
@@ -882,6 +974,7 @@
           <a:p>
             <a:fld id="{60E45991-1322-4FB0-86FC-7102C4823355}" type="slidenum">
               <a:rPr lang="en-US" smtClean="0"/>
+              <a:pPr/>
               <a:t>5</a:t>
             </a:fld>
             <a:endParaRPr lang="en-US"/>
@@ -977,6 +1070,7 @@
           <a:p>
             <a:fld id="{60E45991-1322-4FB0-86FC-7102C4823355}" type="slidenum">
               <a:rPr lang="en-US" smtClean="0"/>
+              <a:pPr/>
               <a:t>6</a:t>
             </a:fld>
             <a:endParaRPr lang="en-US"/>
@@ -1043,15 +1137,7 @@
             </a:r>
             <a:r>
               <a:rPr lang="en-US" baseline="0" dirty="0" smtClean="0"/>
-              <a:t> minimizing the sum of the distances), while matching as many </a:t>
-            </a:r>
-            <a:r>
-              <a:rPr lang="en-US" baseline="0" dirty="0" smtClean="0"/>
-              <a:t>entries</a:t>
-            </a:r>
-            <a:r>
-              <a:rPr lang="en-US" baseline="0" dirty="0" smtClean="0"/>
-              <a:t> as possible</a:t>
+              <a:t> minimizing the sum of the distances), while matching as many entries as possible</a:t>
             </a:r>
             <a:endParaRPr lang="en-US" dirty="0"/>
           </a:p>
@@ -1074,6 +1160,7 @@
           <a:p>
             <a:fld id="{60E45991-1322-4FB0-86FC-7102C4823355}" type="slidenum">
               <a:rPr lang="en-US" smtClean="0"/>
+              <a:pPr/>
               <a:t>7</a:t>
             </a:fld>
             <a:endParaRPr lang="en-US"/>
@@ -1136,23 +1223,11 @@
           <a:p>
             <a:r>
               <a:rPr lang="en-US" dirty="0" smtClean="0"/>
-              <a:t>-RNN high precision</a:t>
-            </a:r>
-          </a:p>
-          <a:p>
-            <a:r>
-              <a:rPr lang="en-US" dirty="0" smtClean="0"/>
-              <a:t>-other algorithms performed</a:t>
-            </a:r>
-            <a:r>
-              <a:rPr lang="en-US" baseline="0" dirty="0" smtClean="0"/>
-              <a:t> similar</a:t>
-            </a:r>
-          </a:p>
-          <a:p>
-            <a:r>
-              <a:rPr lang="en-US" baseline="0" dirty="0" smtClean="0"/>
-              <a:t>-HA might be a tiny bit better, usually not worth the increased cost though (as we will see)</a:t>
+              <a:t>Explain </a:t>
+            </a:r>
+            <a:r>
+              <a:rPr lang="en-US" smtClean="0"/>
+              <a:t>differences between HA and SM</a:t>
             </a:r>
             <a:endParaRPr lang="en-US" dirty="0"/>
           </a:p>
@@ -1175,6 +1250,7 @@
           <a:p>
             <a:fld id="{60E45991-1322-4FB0-86FC-7102C4823355}" type="slidenum">
               <a:rPr lang="en-US" smtClean="0"/>
+              <a:pPr/>
               <a:t>8</a:t>
             </a:fld>
             <a:endParaRPr lang="en-US"/>
@@ -1237,23 +1313,25 @@
           <a:p>
             <a:r>
               <a:rPr lang="en-US" dirty="0" smtClean="0"/>
-              <a:t>And for absolute values:</a:t>
-            </a:r>
-          </a:p>
-          <a:p>
-            <a:endParaRPr lang="en-US" dirty="0" smtClean="0"/>
+              <a:t>-RNN high precision</a:t>
+            </a:r>
           </a:p>
           <a:p>
             <a:r>
               <a:rPr lang="en-US" dirty="0" smtClean="0"/>
-              <a:t>RNN by far the fastest,</a:t>
-            </a:r>
-          </a:p>
-          <a:p>
-            <a:r>
-              <a:rPr lang="en-US" dirty="0" smtClean="0"/>
-              <a:t>GG and SM similar</a:t>
-            </a:r>
+              <a:t>-other algorithms performed</a:t>
+            </a:r>
+            <a:r>
+              <a:rPr lang="en-US" baseline="0" dirty="0" smtClean="0"/>
+              <a:t> similar</a:t>
+            </a:r>
+          </a:p>
+          <a:p>
+            <a:r>
+              <a:rPr lang="en-US" baseline="0" dirty="0" smtClean="0"/>
+              <a:t>-HA might be a tiny bit better, usually not worth the increased cost though (as we will see)</a:t>
+            </a:r>
+            <a:endParaRPr lang="en-US" dirty="0"/>
           </a:p>
         </p:txBody>
       </p:sp>
@@ -1274,6 +1352,7 @@
           <a:p>
             <a:fld id="{60E45991-1322-4FB0-86FC-7102C4823355}" type="slidenum">
               <a:rPr lang="en-US" smtClean="0"/>
+              <a:pPr/>
               <a:t>9</a:t>
             </a:fld>
             <a:endParaRPr lang="en-US"/>
@@ -1336,9 +1415,23 @@
           <a:p>
             <a:r>
               <a:rPr lang="en-US" dirty="0" smtClean="0"/>
-              <a:t>What else?</a:t>
-            </a:r>
-            <a:endParaRPr lang="en-US" dirty="0"/>
+              <a:t>And for absolute values:</a:t>
+            </a:r>
+          </a:p>
+          <a:p>
+            <a:endParaRPr lang="en-US" dirty="0" smtClean="0"/>
+          </a:p>
+          <a:p>
+            <a:r>
+              <a:rPr lang="en-US" dirty="0" smtClean="0"/>
+              <a:t>RNN by far the fastest,</a:t>
+            </a:r>
+          </a:p>
+          <a:p>
+            <a:r>
+              <a:rPr lang="en-US" dirty="0" smtClean="0"/>
+              <a:t>GG and SM similar</a:t>
+            </a:r>
           </a:p>
         </p:txBody>
       </p:sp>
@@ -1359,6 +1452,7 @@
           <a:p>
             <a:fld id="{60E45991-1322-4FB0-86FC-7102C4823355}" type="slidenum">
               <a:rPr lang="en-US" smtClean="0"/>
+              <a:pPr/>
               <a:t>10</a:t>
             </a:fld>
             <a:endParaRPr lang="en-US"/>
@@ -1508,7 +1602,7 @@
             <a:fld id="{1BA50D42-C9CD-4801-B293-61D1F53EC57E}" type="datetimeFigureOut">
               <a:rPr lang="de-DE" smtClean="0"/>
               <a:pPr/>
-              <a:t>31.05.2012</a:t>
+              <a:t>01.06.2012</a:t>
             </a:fld>
             <a:endParaRPr lang="de-DE"/>
           </a:p>
@@ -1823,7 +1917,7 @@
             <a:fld id="{1BA50D42-C9CD-4801-B293-61D1F53EC57E}" type="datetimeFigureOut">
               <a:rPr lang="de-DE" smtClean="0"/>
               <a:pPr/>
-              <a:t>31.05.2012</a:t>
+              <a:t>01.06.2012</a:t>
             </a:fld>
             <a:endParaRPr lang="de-DE"/>
           </a:p>
@@ -2010,7 +2104,7 @@
             <a:fld id="{1BA50D42-C9CD-4801-B293-61D1F53EC57E}" type="datetimeFigureOut">
               <a:rPr lang="de-DE" smtClean="0"/>
               <a:pPr/>
-              <a:t>31.05.2012</a:t>
+              <a:t>01.06.2012</a:t>
             </a:fld>
             <a:endParaRPr lang="de-DE"/>
           </a:p>
@@ -2187,7 +2281,7 @@
             <a:fld id="{1BA50D42-C9CD-4801-B293-61D1F53EC57E}" type="datetimeFigureOut">
               <a:rPr lang="de-DE" smtClean="0"/>
               <a:pPr/>
-              <a:t>31.05.2012</a:t>
+              <a:t>01.06.2012</a:t>
             </a:fld>
             <a:endParaRPr lang="de-DE"/>
           </a:p>
@@ -2457,7 +2551,7 @@
             <a:fld id="{1BA50D42-C9CD-4801-B293-61D1F53EC57E}" type="datetimeFigureOut">
               <a:rPr lang="de-DE" smtClean="0"/>
               <a:pPr/>
-              <a:t>31.05.2012</a:t>
+              <a:t>01.06.2012</a:t>
             </a:fld>
             <a:endParaRPr lang="de-DE"/>
           </a:p>
@@ -2927,7 +3021,7 @@
             <a:fld id="{1BA50D42-C9CD-4801-B293-61D1F53EC57E}" type="datetimeFigureOut">
               <a:rPr lang="de-DE" smtClean="0"/>
               <a:pPr/>
-              <a:t>31.05.2012</a:t>
+              <a:t>01.06.2012</a:t>
             </a:fld>
             <a:endParaRPr lang="de-DE"/>
           </a:p>
@@ -3418,7 +3512,7 @@
             <a:fld id="{1BA50D42-C9CD-4801-B293-61D1F53EC57E}" type="datetimeFigureOut">
               <a:rPr lang="de-DE" smtClean="0"/>
               <a:pPr/>
-              <a:t>31.05.2012</a:t>
+              <a:t>01.06.2012</a:t>
             </a:fld>
             <a:endParaRPr lang="de-DE"/>
           </a:p>
@@ -3546,7 +3640,7 @@
             <a:fld id="{1BA50D42-C9CD-4801-B293-61D1F53EC57E}" type="datetimeFigureOut">
               <a:rPr lang="de-DE" smtClean="0"/>
               <a:pPr/>
-              <a:t>31.05.2012</a:t>
+              <a:t>01.06.2012</a:t>
             </a:fld>
             <a:endParaRPr lang="de-DE"/>
           </a:p>
@@ -3692,7 +3786,7 @@
             <a:fld id="{1BA50D42-C9CD-4801-B293-61D1F53EC57E}" type="datetimeFigureOut">
               <a:rPr lang="de-DE" smtClean="0"/>
               <a:pPr/>
-              <a:t>31.05.2012</a:t>
+              <a:t>01.06.2012</a:t>
             </a:fld>
             <a:endParaRPr lang="de-DE"/>
           </a:p>
@@ -4016,7 +4110,7 @@
             <a:fld id="{1BA50D42-C9CD-4801-B293-61D1F53EC57E}" type="datetimeFigureOut">
               <a:rPr lang="de-DE" smtClean="0"/>
               <a:pPr/>
-              <a:t>31.05.2012</a:t>
+              <a:t>01.06.2012</a:t>
             </a:fld>
             <a:endParaRPr lang="de-DE"/>
           </a:p>
@@ -4152,7 +4246,7 @@
             <a:fld id="{1BA50D42-C9CD-4801-B293-61D1F53EC57E}" type="datetimeFigureOut">
               <a:rPr lang="de-DE" smtClean="0"/>
               <a:pPr/>
-              <a:t>31.05.2012</a:t>
+              <a:t>01.06.2012</a:t>
             </a:fld>
             <a:endParaRPr lang="de-DE"/>
           </a:p>
@@ -4935,7 +5029,7 @@
             <a:fld id="{1BA50D42-C9CD-4801-B293-61D1F53EC57E}" type="datetimeFigureOut">
               <a:rPr lang="de-DE" smtClean="0"/>
               <a:pPr/>
-              <a:t>31.05.2012</a:t>
+              <a:t>01.06.2012</a:t>
             </a:fld>
             <a:endParaRPr lang="de-DE"/>
           </a:p>
@@ -5598,27 +5692,7 @@
                   </a:schemeClr>
                 </a:solidFill>
               </a:rPr>
-              <a:t>Source: </a:t>
-            </a:r>
-            <a:r>
-              <a:rPr lang="en-US" sz="1100" dirty="0" smtClean="0">
-                <a:solidFill>
-                  <a:schemeClr val="bg1">
-                    <a:lumMod val="50000"/>
-                  </a:schemeClr>
-                </a:solidFill>
-              </a:rPr>
-              <a:t>http://news-accounts.com/wp-content</a:t>
-            </a:r>
-            <a:r>
-              <a:rPr lang="en-US" sz="1100" dirty="0" smtClean="0">
-                <a:solidFill>
-                  <a:schemeClr val="bg1">
-                    <a:lumMod val="50000"/>
-                  </a:schemeClr>
-                </a:solidFill>
-              </a:rPr>
-              <a:t>/</a:t>
+              <a:t>Source: http://news-accounts.com/wp-content/</a:t>
             </a:r>
           </a:p>
           <a:p>
@@ -5684,6 +5758,102 @@
           <a:p>
             <a:r>
               <a:rPr lang="en-US" dirty="0" smtClean="0"/>
+              <a:t>Runtime Testing</a:t>
+            </a:r>
+            <a:endParaRPr lang="en-US" dirty="0"/>
+          </a:p>
+        </p:txBody>
+      </p:sp>
+      <p:sp>
+        <p:nvSpPr>
+          <p:cNvPr id="3" name="Content Placeholder 2"/>
+          <p:cNvSpPr>
+            <a:spLocks noGrp="1"/>
+          </p:cNvSpPr>
+          <p:nvPr>
+            <p:ph idx="1"/>
+          </p:nvPr>
+        </p:nvSpPr>
+        <p:spPr/>
+        <p:txBody>
+          <a:bodyPr/>
+          <a:lstStyle/>
+          <a:p>
+            <a:r>
+              <a:rPr lang="en-US" dirty="0" smtClean="0"/>
+              <a:t>RNN O(N^2)</a:t>
+            </a:r>
+          </a:p>
+          <a:p>
+            <a:r>
+              <a:rPr lang="en-US" dirty="0" smtClean="0"/>
+              <a:t>GG O(N^2 * log(N))</a:t>
+            </a:r>
+          </a:p>
+          <a:p>
+            <a:r>
+              <a:rPr lang="en-US" dirty="0" smtClean="0"/>
+              <a:t>SM O(N^2 * log(N))</a:t>
+            </a:r>
+          </a:p>
+          <a:p>
+            <a:r>
+              <a:rPr lang="en-US" dirty="0" smtClean="0"/>
+              <a:t>HA O(N^4)</a:t>
+            </a:r>
+            <a:endParaRPr lang="en-US" dirty="0"/>
+          </a:p>
+        </p:txBody>
+      </p:sp>
+    </p:spTree>
+  </p:cSld>
+  <p:clrMapOvr>
+    <a:masterClrMapping/>
+  </p:clrMapOvr>
+  <p:timing>
+    <p:tnLst>
+      <p:par>
+        <p:cTn id="1" dur="indefinite" restart="never" nodeType="tmRoot"/>
+      </p:par>
+    </p:tnLst>
+  </p:timing>
+</p:sld>
+</file>
+
+<file path=ppt/slides/slide11.xml><?xml version="1.0" encoding="utf-8"?>
+<p:sld xmlns:a="http://schemas.openxmlformats.org/drawingml/2006/main" xmlns:r="http://schemas.openxmlformats.org/officeDocument/2006/relationships" xmlns:p="http://schemas.openxmlformats.org/presentationml/2006/main">
+  <p:cSld>
+    <p:spTree>
+      <p:nvGrpSpPr>
+        <p:cNvPr id="1" name=""/>
+        <p:cNvGrpSpPr/>
+        <p:nvPr/>
+      </p:nvGrpSpPr>
+      <p:grpSpPr>
+        <a:xfrm>
+          <a:off x="0" y="0"/>
+          <a:ext cx="0" cy="0"/>
+          <a:chOff x="0" y="0"/>
+          <a:chExt cx="0" cy="0"/>
+        </a:xfrm>
+      </p:grpSpPr>
+      <p:sp>
+        <p:nvSpPr>
+          <p:cNvPr id="2" name="Title 1"/>
+          <p:cNvSpPr>
+            <a:spLocks noGrp="1"/>
+          </p:cNvSpPr>
+          <p:nvPr>
+            <p:ph type="title"/>
+          </p:nvPr>
+        </p:nvSpPr>
+        <p:spPr/>
+        <p:txBody>
+          <a:bodyPr/>
+          <a:lstStyle/>
+          <a:p>
+            <a:r>
+              <a:rPr lang="en-US" dirty="0" smtClean="0"/>
               <a:t>Conclusion</a:t>
             </a:r>
             <a:endParaRPr lang="en-US" dirty="0"/>
@@ -5729,7 +5899,7 @@
 </p:sld>
 </file>
 
-<file path=ppt/slides/slide11.xml><?xml version="1.0" encoding="utf-8"?>
+<file path=ppt/slides/slide12.xml><?xml version="1.0" encoding="utf-8"?>
 <p:sld xmlns:a="http://schemas.openxmlformats.org/drawingml/2006/main" xmlns:r="http://schemas.openxmlformats.org/officeDocument/2006/relationships" xmlns:p="http://schemas.openxmlformats.org/presentationml/2006/main">
   <p:cSld>
     <p:spTree>
@@ -5831,17 +6001,7 @@
                   </a:schemeClr>
                 </a:solidFill>
               </a:rPr>
-              <a:t>Source: </a:t>
-            </a:r>
-            <a:r>
-              <a:rPr lang="en-US" sz="1100" dirty="0" smtClean="0">
-                <a:solidFill>
-                  <a:schemeClr val="bg1">
-                    <a:lumMod val="50000"/>
-                  </a:schemeClr>
-                </a:solidFill>
-              </a:rPr>
-              <a:t>http://www.payperhead101.com/wp-content/uploads/2012/03/free-pph-demo.jpg</a:t>
+              <a:t>Source: http://www.payperhead101.com/wp-content/uploads/2012/03/free-pph-demo.jpg</a:t>
             </a:r>
             <a:endParaRPr lang="en-US" sz="1100" dirty="0">
               <a:solidFill>
@@ -6031,11 +6191,7 @@
             </a:pPr>
             <a:r>
               <a:rPr lang="en-US" dirty="0" smtClean="0"/>
-              <a:t>Reverse Nearest </a:t>
-            </a:r>
-            <a:r>
-              <a:rPr lang="en-US" dirty="0" smtClean="0"/>
-              <a:t>Neighbor</a:t>
+              <a:t>Reverse Nearest Neighbor</a:t>
             </a:r>
           </a:p>
         </p:txBody>
@@ -6874,17 +7030,7 @@
                   </a:schemeClr>
                 </a:solidFill>
               </a:rPr>
-              <a:t>Source: </a:t>
-            </a:r>
-            <a:r>
-              <a:rPr lang="en-US" sz="1100" dirty="0" smtClean="0">
-                <a:solidFill>
-                  <a:schemeClr val="bg1">
-                    <a:lumMod val="50000"/>
-                  </a:schemeClr>
-                </a:solidFill>
-              </a:rPr>
-              <a:t>http://iqua.ece.toronto.edu/wp-content/uploads/2011/05/sm.gif</a:t>
+              <a:t>Source: http://iqua.ece.toronto.edu/wp-content/uploads/2011/05/sm.gif</a:t>
             </a:r>
             <a:endParaRPr lang="en-US" sz="1100" dirty="0">
               <a:solidFill>
@@ -7051,6 +7197,87 @@
           <a:p>
             <a:r>
               <a:rPr lang="en-US" dirty="0" smtClean="0"/>
+              <a:t>The Algorithms</a:t>
+            </a:r>
+            <a:endParaRPr lang="en-US" dirty="0"/>
+          </a:p>
+        </p:txBody>
+      </p:sp>
+      <p:pic>
+        <p:nvPicPr>
+          <p:cNvPr id="1026" name="Picture 2" descr="C:\Users\ls\workspace\Project SimSearch\presentation\difference_SM_HA.png"/>
+          <p:cNvPicPr>
+            <a:picLocks noChangeAspect="1" noChangeArrowheads="1"/>
+          </p:cNvPicPr>
+          <p:nvPr/>
+        </p:nvPicPr>
+        <p:blipFill>
+          <a:blip r:embed="rId3" cstate="print"/>
+          <a:srcRect/>
+          <a:stretch>
+            <a:fillRect/>
+          </a:stretch>
+        </p:blipFill>
+        <p:spPr bwMode="auto">
+          <a:xfrm>
+            <a:off x="2411760" y="2060848"/>
+            <a:ext cx="5081588" cy="3811588"/>
+          </a:xfrm>
+          <a:prstGeom prst="rect">
+            <a:avLst/>
+          </a:prstGeom>
+          <a:noFill/>
+        </p:spPr>
+      </p:pic>
+    </p:spTree>
+  </p:cSld>
+  <p:clrMapOvr>
+    <a:masterClrMapping/>
+  </p:clrMapOvr>
+  <p:timing>
+    <p:tnLst>
+      <p:par>
+        <p:cTn id="1" dur="indefinite" restart="never" nodeType="tmRoot"/>
+      </p:par>
+    </p:tnLst>
+  </p:timing>
+</p:sld>
+</file>
+
+<file path=ppt/slides/slide9.xml><?xml version="1.0" encoding="utf-8"?>
+<p:sld xmlns:a="http://schemas.openxmlformats.org/drawingml/2006/main" xmlns:r="http://schemas.openxmlformats.org/officeDocument/2006/relationships" xmlns:p="http://schemas.openxmlformats.org/presentationml/2006/main">
+  <p:cSld>
+    <p:spTree>
+      <p:nvGrpSpPr>
+        <p:cNvPr id="1" name=""/>
+        <p:cNvGrpSpPr/>
+        <p:nvPr/>
+      </p:nvGrpSpPr>
+      <p:grpSpPr>
+        <a:xfrm>
+          <a:off x="0" y="0"/>
+          <a:ext cx="0" cy="0"/>
+          <a:chOff x="0" y="0"/>
+          <a:chExt cx="0" cy="0"/>
+        </a:xfrm>
+      </p:grpSpPr>
+      <p:sp>
+        <p:nvSpPr>
+          <p:cNvPr id="2" name="Title 1"/>
+          <p:cNvSpPr>
+            <a:spLocks noGrp="1"/>
+          </p:cNvSpPr>
+          <p:nvPr>
+            <p:ph type="title"/>
+          </p:nvPr>
+        </p:nvSpPr>
+        <p:spPr/>
+        <p:txBody>
+          <a:bodyPr/>
+          <a:lstStyle/>
+          <a:p>
+            <a:r>
+              <a:rPr lang="en-US" dirty="0" smtClean="0"/>
               <a:t>Quality Testing</a:t>
             </a:r>
             <a:endParaRPr lang="en-US" dirty="0"/>
@@ -7148,8 +7375,10 @@
                   </a:schemeClr>
                 </a:solidFill>
               </a:rPr>
-              <a:t>Source: </a:t>
-            </a:r>
+              <a:t>Source: http://t3.gstatic.com/images?q=tbn:ANd9GcRUI0FuGF1i</a:t>
+            </a:r>
+          </a:p>
+          <a:p>
             <a:r>
               <a:rPr lang="en-US" sz="1100" dirty="0" smtClean="0">
                 <a:solidFill>
@@ -7158,39 +7387,7 @@
                   </a:schemeClr>
                 </a:solidFill>
               </a:rPr>
-              <a:t>http://</a:t>
-            </a:r>
-            <a:r>
-              <a:rPr lang="en-US" sz="1100" dirty="0" smtClean="0">
-                <a:solidFill>
-                  <a:schemeClr val="bg1">
-                    <a:lumMod val="50000"/>
-                  </a:schemeClr>
-                </a:solidFill>
-              </a:rPr>
-              <a:t>t3.gstatic.com/images?q=tbn:ANd9GcRUI0FuGF1i</a:t>
-            </a:r>
-          </a:p>
-          <a:p>
-            <a:r>
-              <a:rPr lang="en-US" sz="1100" dirty="0" smtClean="0">
-                <a:solidFill>
-                  <a:schemeClr val="bg1">
-                    <a:lumMod val="50000"/>
-                  </a:schemeClr>
-                </a:solidFill>
-              </a:rPr>
-              <a:t>YiRXSFOpfVo9YYB5_88qObv4bDUgkXo4LBtejkybmny0fka</a:t>
-            </a:r>
-            <a:r>
-              <a:rPr lang="en-US" sz="1100" dirty="0" smtClean="0">
-                <a:solidFill>
-                  <a:schemeClr val="bg1">
-                    <a:lumMod val="50000"/>
-                  </a:schemeClr>
-                </a:solidFill>
-              </a:rPr>
-              <a:t>_</a:t>
+              <a:t>YiRXSFOpfVo9YYB5_88qObv4bDUgkXo4LBtejkybmny0fka_</a:t>
             </a:r>
             <a:endParaRPr lang="en-US" sz="1100" dirty="0">
               <a:solidFill>
@@ -7207,106 +7404,6 @@
   <p:clrMapOvr>
     <a:masterClrMapping/>
   </p:clrMapOvr>
-</p:sld>
-</file>
-
-<file path=ppt/slides/slide9.xml><?xml version="1.0" encoding="utf-8"?>
-<p:sld xmlns:a="http://schemas.openxmlformats.org/drawingml/2006/main" xmlns:r="http://schemas.openxmlformats.org/officeDocument/2006/relationships" xmlns:p="http://schemas.openxmlformats.org/presentationml/2006/main">
-  <p:cSld>
-    <p:spTree>
-      <p:nvGrpSpPr>
-        <p:cNvPr id="1" name=""/>
-        <p:cNvGrpSpPr/>
-        <p:nvPr/>
-      </p:nvGrpSpPr>
-      <p:grpSpPr>
-        <a:xfrm>
-          <a:off x="0" y="0"/>
-          <a:ext cx="0" cy="0"/>
-          <a:chOff x="0" y="0"/>
-          <a:chExt cx="0" cy="0"/>
-        </a:xfrm>
-      </p:grpSpPr>
-      <p:sp>
-        <p:nvSpPr>
-          <p:cNvPr id="2" name="Title 1"/>
-          <p:cNvSpPr>
-            <a:spLocks noGrp="1"/>
-          </p:cNvSpPr>
-          <p:nvPr>
-            <p:ph type="title"/>
-          </p:nvPr>
-        </p:nvSpPr>
-        <p:spPr/>
-        <p:txBody>
-          <a:bodyPr/>
-          <a:lstStyle/>
-          <a:p>
-            <a:r>
-              <a:rPr lang="en-US" dirty="0" smtClean="0"/>
-              <a:t>Runtime Testing</a:t>
-            </a:r>
-            <a:endParaRPr lang="en-US" dirty="0"/>
-          </a:p>
-        </p:txBody>
-      </p:sp>
-      <p:sp>
-        <p:nvSpPr>
-          <p:cNvPr id="3" name="Content Placeholder 2"/>
-          <p:cNvSpPr>
-            <a:spLocks noGrp="1"/>
-          </p:cNvSpPr>
-          <p:nvPr>
-            <p:ph idx="1"/>
-          </p:nvPr>
-        </p:nvSpPr>
-        <p:spPr/>
-        <p:txBody>
-          <a:bodyPr/>
-          <a:lstStyle/>
-          <a:p>
-            <a:r>
-              <a:rPr lang="en-US" dirty="0" smtClean="0"/>
-              <a:t>RNN O(N^2)</a:t>
-            </a:r>
-          </a:p>
-          <a:p>
-            <a:r>
-              <a:rPr lang="en-US" dirty="0" smtClean="0"/>
-              <a:t>GG O(N^2 * log(N))</a:t>
-            </a:r>
-          </a:p>
-          <a:p>
-            <a:r>
-              <a:rPr lang="en-US" dirty="0" smtClean="0"/>
-              <a:t>SM </a:t>
-            </a:r>
-            <a:r>
-              <a:rPr lang="en-US" dirty="0" smtClean="0"/>
-              <a:t>O(N^2 * log(N))</a:t>
-            </a:r>
-          </a:p>
-          <a:p>
-            <a:r>
-              <a:rPr lang="en-US" dirty="0" smtClean="0"/>
-              <a:t>HA O(N^4)</a:t>
-            </a:r>
-            <a:endParaRPr lang="en-US" dirty="0"/>
-          </a:p>
-        </p:txBody>
-      </p:sp>
-    </p:spTree>
-  </p:cSld>
-  <p:clrMapOvr>
-    <a:masterClrMapping/>
-  </p:clrMapOvr>
-  <p:timing>
-    <p:tnLst>
-      <p:par>
-        <p:cTn id="1" dur="indefinite" restart="never" nodeType="tmRoot"/>
-      </p:par>
-    </p:tnLst>
-  </p:timing>
 </p:sld>
 </file>
 

</xml_diff>